<commit_message>
Update Präsentation Programmieren Galgenmännchen.pptx
Ausgabe der Konsole
</commit_message>
<xml_diff>
--- a/Präsentation Programmieren Galgenmännchen.pptx
+++ b/Präsentation Programmieren Galgenmännchen.pptx
@@ -5,22 +5,23 @@
     <p:sldMasterId id="2147483648" r:id="rId4"/>
   </p:sldMasterIdLst>
   <p:notesMasterIdLst>
-    <p:notesMasterId r:id="rId15"/>
+    <p:notesMasterId r:id="rId16"/>
   </p:notesMasterIdLst>
   <p:handoutMasterIdLst>
-    <p:handoutMasterId r:id="rId16"/>
+    <p:handoutMasterId r:id="rId17"/>
   </p:handoutMasterIdLst>
   <p:sldIdLst>
     <p:sldId id="282" r:id="rId5"/>
     <p:sldId id="297" r:id="rId6"/>
     <p:sldId id="301" r:id="rId7"/>
     <p:sldId id="302" r:id="rId8"/>
-    <p:sldId id="303" r:id="rId9"/>
-    <p:sldId id="304" r:id="rId10"/>
-    <p:sldId id="298" r:id="rId11"/>
-    <p:sldId id="299" r:id="rId12"/>
-    <p:sldId id="300" r:id="rId13"/>
-    <p:sldId id="296" r:id="rId14"/>
+    <p:sldId id="305" r:id="rId9"/>
+    <p:sldId id="303" r:id="rId10"/>
+    <p:sldId id="304" r:id="rId11"/>
+    <p:sldId id="298" r:id="rId12"/>
+    <p:sldId id="299" r:id="rId13"/>
+    <p:sldId id="300" r:id="rId14"/>
+    <p:sldId id="296" r:id="rId15"/>
   </p:sldIdLst>
   <p:sldSz cx="12192000" cy="6858000"/>
   <p:notesSz cx="6858000" cy="9144000"/>
@@ -132,6 +133,7 @@
             <p14:sldId id="297"/>
             <p14:sldId id="301"/>
             <p14:sldId id="302"/>
+            <p14:sldId id="305"/>
             <p14:sldId id="303"/>
             <p14:sldId id="304"/>
             <p14:sldId id="298"/>
@@ -1031,7 +1033,7 @@
             <a:pPr rtl="0"/>
             <a:fld id="{8530193B-564F-4854-8A52-728F3FB19C85}" type="slidenum">
               <a:rPr lang="de-DE" smtClean="0"/>
-              <a:t>7</a:t>
+              <a:t>8</a:t>
             </a:fld>
             <a:endParaRPr lang="de-DE"/>
           </a:p>
@@ -1117,7 +1119,7 @@
             <a:pPr rtl="0"/>
             <a:fld id="{8530193B-564F-4854-8A52-728F3FB19C85}" type="slidenum">
               <a:rPr lang="de-DE" smtClean="0"/>
-              <a:t>8</a:t>
+              <a:t>9</a:t>
             </a:fld>
             <a:endParaRPr lang="de-DE"/>
           </a:p>
@@ -1203,7 +1205,7 @@
             <a:pPr rtl="0"/>
             <a:fld id="{8530193B-564F-4854-8A52-728F3FB19C85}" type="slidenum">
               <a:rPr lang="de-DE" smtClean="0"/>
-              <a:t>9</a:t>
+              <a:t>10</a:t>
             </a:fld>
             <a:endParaRPr lang="de-DE"/>
           </a:p>
@@ -1289,7 +1291,7 @@
             <a:pPr rtl="0"/>
             <a:fld id="{8530193B-564F-4854-8A52-728F3FB19C85}" type="slidenum">
               <a:rPr lang="de-DE" smtClean="0"/>
-              <a:t>10</a:t>
+              <a:t>11</a:t>
             </a:fld>
             <a:endParaRPr lang="de-DE"/>
           </a:p>
@@ -8968,6 +8970,105 @@
       </p:grpSpPr>
       <p:sp>
         <p:nvSpPr>
+          <p:cNvPr id="22" name="Textfeld 21">
+            <a:extLst>
+              <a:ext uri="{FF2B5EF4-FFF2-40B4-BE49-F238E27FC236}">
+                <a16:creationId xmlns:a16="http://schemas.microsoft.com/office/drawing/2014/main" id="{19352CF6-0F22-45A8-B28B-37FAFCE5C5D6}"/>
+              </a:ext>
+            </a:extLst>
+          </p:cNvPr>
+          <p:cNvSpPr txBox="1"/>
+          <p:nvPr/>
+        </p:nvSpPr>
+        <p:spPr>
+          <a:xfrm>
+            <a:off x="10251642" y="182562"/>
+            <a:ext cx="1662546" cy="404658"/>
+          </a:xfrm>
+          <a:prstGeom prst="rect">
+            <a:avLst/>
+          </a:prstGeom>
+          <a:noFill/>
+        </p:spPr>
+        <p:txBody>
+          <a:bodyPr wrap="square" lIns="0" tIns="36000" rIns="0" bIns="0" rtlCol="0">
+            <a:spAutoFit/>
+          </a:bodyPr>
+          <a:lstStyle/>
+          <a:p>
+            <a:pPr algn="r" rtl="0">
+              <a:lnSpc>
+                <a:spcPts val="1400"/>
+              </a:lnSpc>
+            </a:pPr>
+            <a:r>
+              <a:rPr lang="de-DE" sz="1600" b="1" spc="-100" dirty="0">
+                <a:solidFill>
+                  <a:schemeClr val="tx1">
+                    <a:lumMod val="50000"/>
+                    <a:lumOff val="50000"/>
+                  </a:schemeClr>
+                </a:solidFill>
+                <a:latin typeface="Corbel" panose="020B0503020204020204" pitchFamily="34" charset="0"/>
+              </a:rPr>
+              <a:t>Programmieren</a:t>
+            </a:r>
+            <a:r>
+              <a:rPr lang="de-DE" sz="1600" b="1" spc="-100" dirty="0">
+                <a:solidFill>
+                  <a:schemeClr val="accent1"/>
+                </a:solidFill>
+                <a:latin typeface="Corbel" panose="020B0503020204020204" pitchFamily="34" charset="0"/>
+              </a:rPr>
+              <a:t> </a:t>
+            </a:r>
+            <a:r>
+              <a:rPr lang="de-DE" sz="1600" b="1" spc="-100" dirty="0">
+                <a:latin typeface="Corbel" panose="020B0503020204020204" pitchFamily="34" charset="0"/>
+              </a:rPr>
+              <a:t>ON22</a:t>
+            </a:r>
+            <a:endParaRPr lang="de-DE" sz="1600" b="1" spc="-100" dirty="0">
+              <a:solidFill>
+                <a:schemeClr val="tx1"/>
+              </a:solidFill>
+              <a:latin typeface="Corbel" panose="020B0503020204020204" pitchFamily="34" charset="0"/>
+            </a:endParaRPr>
+          </a:p>
+        </p:txBody>
+      </p:sp>
+    </p:spTree>
+    <p:extLst>
+      <p:ext uri="{BB962C8B-B14F-4D97-AF65-F5344CB8AC3E}">
+        <p14:creationId xmlns:p14="http://schemas.microsoft.com/office/powerpoint/2010/main" val="1228077506"/>
+      </p:ext>
+    </p:extLst>
+  </p:cSld>
+  <p:clrMapOvr>
+    <a:masterClrMapping/>
+  </p:clrMapOvr>
+</p:sld>
+</file>
+
+<file path=ppt/slides/slide11.xml><?xml version="1.0" encoding="utf-8"?>
+<p:sld xmlns:a="http://schemas.openxmlformats.org/drawingml/2006/main" xmlns:r="http://schemas.openxmlformats.org/officeDocument/2006/relationships" xmlns:p="http://schemas.openxmlformats.org/presentationml/2006/main">
+  <p:cSld>
+    <p:spTree>
+      <p:nvGrpSpPr>
+        <p:cNvPr id="1" name=""/>
+        <p:cNvGrpSpPr/>
+        <p:nvPr/>
+      </p:nvGrpSpPr>
+      <p:grpSpPr>
+        <a:xfrm>
+          <a:off x="0" y="0"/>
+          <a:ext cx="0" cy="0"/>
+          <a:chOff x="0" y="0"/>
+          <a:chExt cx="0" cy="0"/>
+        </a:xfrm>
+      </p:grpSpPr>
+      <p:sp>
+        <p:nvSpPr>
           <p:cNvPr id="20" name="Titel 19">
             <a:extLst>
               <a:ext uri="{FF2B5EF4-FFF2-40B4-BE49-F238E27FC236}">
@@ -10227,38 +10328,10 @@
       </p:grpSpPr>
       <p:sp>
         <p:nvSpPr>
-          <p:cNvPr id="2" name="Titel 1">
-            <a:extLst>
-              <a:ext uri="{FF2B5EF4-FFF2-40B4-BE49-F238E27FC236}">
-                <a16:creationId xmlns:a16="http://schemas.microsoft.com/office/drawing/2014/main" id="{EA54CF6B-B10C-4735-B257-CDDB3C8EA3F6}"/>
-              </a:ext>
-            </a:extLst>
-          </p:cNvPr>
-          <p:cNvSpPr>
-            <a:spLocks noGrp="1"/>
-          </p:cNvSpPr>
-          <p:nvPr>
-            <p:ph type="title"/>
-          </p:nvPr>
-        </p:nvSpPr>
-        <p:spPr/>
-        <p:txBody>
-          <a:bodyPr/>
-          <a:lstStyle/>
-          <a:p>
-            <a:r>
-              <a:rPr lang="de-DE" dirty="0"/>
-              <a:t>Benötigte Funktionen</a:t>
-            </a:r>
-          </a:p>
-        </p:txBody>
-      </p:sp>
-      <p:sp>
-        <p:nvSpPr>
           <p:cNvPr id="3" name="Foliennummernplatzhalter 2">
             <a:extLst>
               <a:ext uri="{FF2B5EF4-FFF2-40B4-BE49-F238E27FC236}">
-                <a16:creationId xmlns:a16="http://schemas.microsoft.com/office/drawing/2014/main" id="{88071F06-B6F6-4E7D-97ED-79D91287B15D}"/>
+                <a16:creationId xmlns:a16="http://schemas.microsoft.com/office/drawing/2014/main" id="{71CF6145-C529-4AD7-895B-27CF9EBECD4F}"/>
               </a:ext>
             </a:extLst>
           </p:cNvPr>
@@ -10289,7 +10362,7 @@
           <p:cNvPr id="4" name="Inhaltsplatzhalter 3">
             <a:extLst>
               <a:ext uri="{FF2B5EF4-FFF2-40B4-BE49-F238E27FC236}">
-                <a16:creationId xmlns:a16="http://schemas.microsoft.com/office/drawing/2014/main" id="{0C4D8DE7-85ED-4221-AD32-3A7A5B47185B}"/>
+                <a16:creationId xmlns:a16="http://schemas.microsoft.com/office/drawing/2014/main" id="{E7FBC52F-1CB0-4AA8-8E8C-E9C44A90947E}"/>
               </a:ext>
             </a:extLst>
           </p:cNvPr>
@@ -10300,12 +10373,7 @@
             <p:ph idx="1"/>
           </p:nvPr>
         </p:nvSpPr>
-        <p:spPr>
-          <a:xfrm>
-            <a:off x="432000" y="1046375"/>
-            <a:ext cx="9198000" cy="5739436"/>
-          </a:xfrm>
-        </p:spPr>
+        <p:spPr/>
         <p:txBody>
           <a:bodyPr/>
           <a:lstStyle/>
@@ -10321,30 +10389,10 @@
             </a:pPr>
             <a:r>
               <a:rPr lang="de-DE" sz="2400" b="1" u="sng" dirty="0">
-                <a:effectLst/>
                 <a:latin typeface="Calibri" panose="020F0502020204030204" pitchFamily="34" charset="0"/>
                 <a:ea typeface="Calibri" panose="020F0502020204030204" pitchFamily="34" charset="0"/>
               </a:rPr>
-              <a:t>Spielablauf</a:t>
-            </a:r>
-          </a:p>
-          <a:p>
-            <a:pPr marL="0" indent="0">
-              <a:lnSpc>
-                <a:spcPct val="107000"/>
-              </a:lnSpc>
-              <a:spcAft>
-                <a:spcPts val="800"/>
-              </a:spcAft>
-              <a:buNone/>
-            </a:pPr>
-            <a:r>
-              <a:rPr lang="de-DE" sz="1800" b="1" dirty="0">
-                <a:effectLst/>
-                <a:latin typeface="Calibri" panose="020F0502020204030204" pitchFamily="34" charset="0"/>
-                <a:ea typeface="Calibri" panose="020F0502020204030204" pitchFamily="34" charset="0"/>
-              </a:rPr>
-              <a:t>Funktionen:</a:t>
+              <a:t>Ausgabe der Konsole</a:t>
             </a:r>
           </a:p>
           <a:p>
@@ -10357,28 +10405,19 @@
               </a:spcAft>
             </a:pPr>
             <a:r>
+              <a:rPr lang="de-DE" dirty="0">
+                <a:latin typeface="Calibri" panose="020F0502020204030204" pitchFamily="34" charset="0"/>
+                <a:ea typeface="Calibri" panose="020F0502020204030204" pitchFamily="34" charset="0"/>
+              </a:rPr>
+              <a:t>„</a:t>
+            </a:r>
+            <a:r>
               <a:rPr lang="de-DE" sz="1800" dirty="0">
                 <a:effectLst/>
                 <a:latin typeface="Calibri" panose="020F0502020204030204" pitchFamily="34" charset="0"/>
                 <a:ea typeface="Calibri" panose="020F0502020204030204" pitchFamily="34" charset="0"/>
               </a:rPr>
-              <a:t>„</a:t>
-            </a:r>
-            <a:r>
-              <a:rPr lang="de-DE" sz="1800" dirty="0" err="1">
-                <a:effectLst/>
-                <a:latin typeface="Calibri" panose="020F0502020204030204" pitchFamily="34" charset="0"/>
-                <a:ea typeface="Calibri" panose="020F0502020204030204" pitchFamily="34" charset="0"/>
-              </a:rPr>
-              <a:t>zeichneSpiel</a:t>
-            </a:r>
-            <a:r>
-              <a:rPr lang="de-DE" sz="1800" dirty="0">
-                <a:effectLst/>
-                <a:latin typeface="Calibri" panose="020F0502020204030204" pitchFamily="34" charset="0"/>
-                <a:ea typeface="Calibri" panose="020F0502020204030204" pitchFamily="34" charset="0"/>
-              </a:rPr>
-              <a:t>“, um die Zeichnung dann auch ausgeben zu können</a:t>
+              <a:t>Hurra! Deine Eingabe war richtig!”, wenn Eingabe richtig ist</a:t>
             </a:r>
           </a:p>
           <a:p>
@@ -10395,21 +10434,202 @@
                 <a:latin typeface="Calibri" panose="020F0502020204030204" pitchFamily="34" charset="0"/>
                 <a:ea typeface="Calibri" panose="020F0502020204030204" pitchFamily="34" charset="0"/>
               </a:rPr>
-              <a:t>„</a:t>
-            </a:r>
-            <a:r>
-              <a:rPr lang="de-DE" dirty="0" err="1">
+              <a:t>„Das war leider falsch“, wenn Eingabe falsch ist</a:t>
+            </a:r>
+            <a:endParaRPr lang="de-DE" sz="1800" dirty="0">
+              <a:effectLst/>
+              <a:latin typeface="Calibri" panose="020F0502020204030204" pitchFamily="34" charset="0"/>
+              <a:ea typeface="Calibri" panose="020F0502020204030204" pitchFamily="34" charset="0"/>
+            </a:endParaRPr>
+          </a:p>
+          <a:p>
+            <a:endParaRPr lang="de-DE" dirty="0"/>
+          </a:p>
+        </p:txBody>
+      </p:sp>
+      <p:sp>
+        <p:nvSpPr>
+          <p:cNvPr id="5" name="Titel 1">
+            <a:extLst>
+              <a:ext uri="{FF2B5EF4-FFF2-40B4-BE49-F238E27FC236}">
+                <a16:creationId xmlns:a16="http://schemas.microsoft.com/office/drawing/2014/main" id="{5FE1634F-6E2B-40B7-A855-BE7DF9F81943}"/>
+              </a:ext>
+            </a:extLst>
+          </p:cNvPr>
+          <p:cNvSpPr>
+            <a:spLocks noGrp="1"/>
+          </p:cNvSpPr>
+          <p:nvPr>
+            <p:ph type="title"/>
+          </p:nvPr>
+        </p:nvSpPr>
+        <p:spPr>
+          <a:xfrm>
+            <a:off x="431800" y="431800"/>
+            <a:ext cx="9197975" cy="431800"/>
+          </a:xfrm>
+        </p:spPr>
+        <p:txBody>
+          <a:bodyPr/>
+          <a:lstStyle/>
+          <a:p>
+            <a:r>
+              <a:rPr lang="de-DE" dirty="0"/>
+              <a:t>Benötigte Funktionen</a:t>
+            </a:r>
+          </a:p>
+        </p:txBody>
+      </p:sp>
+    </p:spTree>
+    <p:extLst>
+      <p:ext uri="{BB962C8B-B14F-4D97-AF65-F5344CB8AC3E}">
+        <p14:creationId xmlns:p14="http://schemas.microsoft.com/office/powerpoint/2010/main" val="1049613153"/>
+      </p:ext>
+    </p:extLst>
+  </p:cSld>
+  <p:clrMapOvr>
+    <a:masterClrMapping/>
+  </p:clrMapOvr>
+</p:sld>
+</file>
+
+<file path=ppt/slides/slide6.xml><?xml version="1.0" encoding="utf-8"?>
+<p:sld xmlns:a="http://schemas.openxmlformats.org/drawingml/2006/main" xmlns:r="http://schemas.openxmlformats.org/officeDocument/2006/relationships" xmlns:p="http://schemas.openxmlformats.org/presentationml/2006/main">
+  <p:cSld>
+    <p:spTree>
+      <p:nvGrpSpPr>
+        <p:cNvPr id="1" name=""/>
+        <p:cNvGrpSpPr/>
+        <p:nvPr/>
+      </p:nvGrpSpPr>
+      <p:grpSpPr>
+        <a:xfrm>
+          <a:off x="0" y="0"/>
+          <a:ext cx="0" cy="0"/>
+          <a:chOff x="0" y="0"/>
+          <a:chExt cx="0" cy="0"/>
+        </a:xfrm>
+      </p:grpSpPr>
+      <p:sp>
+        <p:nvSpPr>
+          <p:cNvPr id="2" name="Titel 1">
+            <a:extLst>
+              <a:ext uri="{FF2B5EF4-FFF2-40B4-BE49-F238E27FC236}">
+                <a16:creationId xmlns:a16="http://schemas.microsoft.com/office/drawing/2014/main" id="{EA54CF6B-B10C-4735-B257-CDDB3C8EA3F6}"/>
+              </a:ext>
+            </a:extLst>
+          </p:cNvPr>
+          <p:cNvSpPr>
+            <a:spLocks noGrp="1"/>
+          </p:cNvSpPr>
+          <p:nvPr>
+            <p:ph type="title"/>
+          </p:nvPr>
+        </p:nvSpPr>
+        <p:spPr/>
+        <p:txBody>
+          <a:bodyPr/>
+          <a:lstStyle/>
+          <a:p>
+            <a:r>
+              <a:rPr lang="de-DE" dirty="0"/>
+              <a:t>Benötigte Funktionen</a:t>
+            </a:r>
+          </a:p>
+        </p:txBody>
+      </p:sp>
+      <p:sp>
+        <p:nvSpPr>
+          <p:cNvPr id="3" name="Foliennummernplatzhalter 2">
+            <a:extLst>
+              <a:ext uri="{FF2B5EF4-FFF2-40B4-BE49-F238E27FC236}">
+                <a16:creationId xmlns:a16="http://schemas.microsoft.com/office/drawing/2014/main" id="{88071F06-B6F6-4E7D-97ED-79D91287B15D}"/>
+              </a:ext>
+            </a:extLst>
+          </p:cNvPr>
+          <p:cNvSpPr>
+            <a:spLocks noGrp="1"/>
+          </p:cNvSpPr>
+          <p:nvPr>
+            <p:ph type="sldNum" sz="quarter" idx="33"/>
+          </p:nvPr>
+        </p:nvSpPr>
+        <p:spPr/>
+        <p:txBody>
+          <a:bodyPr/>
+          <a:lstStyle/>
+          <a:p>
+            <a:pPr rtl="0"/>
+            <a:fld id="{19B51A1E-902D-48AF-9020-955120F399B6}" type="slidenum">
+              <a:rPr lang="de-DE" noProof="0" smtClean="0"/>
+              <a:pPr rtl="0"/>
+              <a:t>6</a:t>
+            </a:fld>
+            <a:endParaRPr lang="de-DE" noProof="0"/>
+          </a:p>
+        </p:txBody>
+      </p:sp>
+      <p:sp>
+        <p:nvSpPr>
+          <p:cNvPr id="4" name="Inhaltsplatzhalter 3">
+            <a:extLst>
+              <a:ext uri="{FF2B5EF4-FFF2-40B4-BE49-F238E27FC236}">
+                <a16:creationId xmlns:a16="http://schemas.microsoft.com/office/drawing/2014/main" id="{0C4D8DE7-85ED-4221-AD32-3A7A5B47185B}"/>
+              </a:ext>
+            </a:extLst>
+          </p:cNvPr>
+          <p:cNvSpPr>
+            <a:spLocks noGrp="1"/>
+          </p:cNvSpPr>
+          <p:nvPr>
+            <p:ph idx="1"/>
+          </p:nvPr>
+        </p:nvSpPr>
+        <p:spPr>
+          <a:xfrm>
+            <a:off x="432000" y="1046375"/>
+            <a:ext cx="9198000" cy="5739436"/>
+          </a:xfrm>
+        </p:spPr>
+        <p:txBody>
+          <a:bodyPr/>
+          <a:lstStyle/>
+          <a:p>
+            <a:pPr marL="0" indent="0">
+              <a:lnSpc>
+                <a:spcPct val="107000"/>
+              </a:lnSpc>
+              <a:spcAft>
+                <a:spcPts val="800"/>
+              </a:spcAft>
+              <a:buNone/>
+            </a:pPr>
+            <a:r>
+              <a:rPr lang="de-DE" sz="2400" b="1" u="sng" dirty="0">
+                <a:effectLst/>
                 <a:latin typeface="Calibri" panose="020F0502020204030204" pitchFamily="34" charset="0"/>
                 <a:ea typeface="Calibri" panose="020F0502020204030204" pitchFamily="34" charset="0"/>
               </a:rPr>
-              <a:t>vergleichechar</a:t>
-            </a:r>
-            <a:r>
-              <a:rPr lang="de-DE" dirty="0">
+              <a:t>Spielablauf</a:t>
+            </a:r>
+          </a:p>
+          <a:p>
+            <a:pPr marL="0" indent="0">
+              <a:lnSpc>
+                <a:spcPct val="107000"/>
+              </a:lnSpc>
+              <a:spcAft>
+                <a:spcPts val="800"/>
+              </a:spcAft>
+              <a:buNone/>
+            </a:pPr>
+            <a:r>
+              <a:rPr lang="de-DE" sz="1800" b="1" dirty="0">
+                <a:effectLst/>
                 <a:latin typeface="Calibri" panose="020F0502020204030204" pitchFamily="34" charset="0"/>
                 <a:ea typeface="Calibri" panose="020F0502020204030204" pitchFamily="34" charset="0"/>
               </a:rPr>
-              <a:t>“</a:t>
+              <a:t>Funktionen:</a:t>
             </a:r>
           </a:p>
           <a:p>
@@ -10422,11 +10642,28 @@
               </a:spcAft>
             </a:pPr>
             <a:r>
-              <a:rPr lang="de-DE" dirty="0">
+              <a:rPr lang="de-DE" sz="1800" dirty="0">
+                <a:effectLst/>
                 <a:latin typeface="Calibri" panose="020F0502020204030204" pitchFamily="34" charset="0"/>
                 <a:ea typeface="Calibri" panose="020F0502020204030204" pitchFamily="34" charset="0"/>
               </a:rPr>
-              <a:t>„Schonversucht“</a:t>
+              <a:t>„</a:t>
+            </a:r>
+            <a:r>
+              <a:rPr lang="de-DE" sz="1800" dirty="0" err="1">
+                <a:effectLst/>
+                <a:latin typeface="Calibri" panose="020F0502020204030204" pitchFamily="34" charset="0"/>
+                <a:ea typeface="Calibri" panose="020F0502020204030204" pitchFamily="34" charset="0"/>
+              </a:rPr>
+              <a:t>zeichneSpiel</a:t>
+            </a:r>
+            <a:r>
+              <a:rPr lang="de-DE" sz="1800" dirty="0">
+                <a:effectLst/>
+                <a:latin typeface="Calibri" panose="020F0502020204030204" pitchFamily="34" charset="0"/>
+                <a:ea typeface="Calibri" panose="020F0502020204030204" pitchFamily="34" charset="0"/>
+              </a:rPr>
+              <a:t>“, um die Zeichnung dann auch ausgeben zu können</a:t>
             </a:r>
           </a:p>
           <a:p>
@@ -10450,14 +10687,14 @@
                 <a:latin typeface="Calibri" panose="020F0502020204030204" pitchFamily="34" charset="0"/>
                 <a:ea typeface="Calibri" panose="020F0502020204030204" pitchFamily="34" charset="0"/>
               </a:rPr>
-              <a:t>getstatus</a:t>
+              <a:t>vergleichechar</a:t>
             </a:r>
             <a:r>
               <a:rPr lang="de-DE" dirty="0">
                 <a:latin typeface="Calibri" panose="020F0502020204030204" pitchFamily="34" charset="0"/>
                 <a:ea typeface="Calibri" panose="020F0502020204030204" pitchFamily="34" charset="0"/>
               </a:rPr>
-              <a:t>“ aktueller Spielstatus</a:t>
+              <a:t>“</a:t>
             </a:r>
           </a:p>
           <a:p>
@@ -10474,15 +10711,7 @@
                 <a:latin typeface="Calibri" panose="020F0502020204030204" pitchFamily="34" charset="0"/>
                 <a:ea typeface="Calibri" panose="020F0502020204030204" pitchFamily="34" charset="0"/>
               </a:rPr>
-              <a:t>„</a:t>
-            </a:r>
-            <a:r>
-              <a:rPr lang="de-DE" sz="1800" dirty="0">
-                <a:effectLst/>
-                <a:latin typeface="Calibri" panose="020F0502020204030204" pitchFamily="34" charset="0"/>
-                <a:ea typeface="Calibri" panose="020F0502020204030204" pitchFamily="34" charset="0"/>
-              </a:rPr>
-              <a:t>Hurra! Deine Eingabe war richtig!”, wenn Eingabe richtig war</a:t>
+              <a:t>„Schonversucht“</a:t>
             </a:r>
           </a:p>
           <a:p>
@@ -10499,10 +10728,34 @@
                 <a:latin typeface="Calibri" panose="020F0502020204030204" pitchFamily="34" charset="0"/>
                 <a:ea typeface="Calibri" panose="020F0502020204030204" pitchFamily="34" charset="0"/>
               </a:rPr>
-              <a:t>„Das war leider falsch“, wenn Eingabe falsch war</a:t>
-            </a:r>
-            <a:endParaRPr lang="de-DE" sz="1800" dirty="0">
-              <a:effectLst/>
+              <a:t>„</a:t>
+            </a:r>
+            <a:r>
+              <a:rPr lang="de-DE" dirty="0" err="1">
+                <a:latin typeface="Calibri" panose="020F0502020204030204" pitchFamily="34" charset="0"/>
+                <a:ea typeface="Calibri" panose="020F0502020204030204" pitchFamily="34" charset="0"/>
+              </a:rPr>
+              <a:t>getstatus</a:t>
+            </a:r>
+            <a:r>
+              <a:rPr lang="de-DE" dirty="0">
+                <a:latin typeface="Calibri" panose="020F0502020204030204" pitchFamily="34" charset="0"/>
+                <a:ea typeface="Calibri" panose="020F0502020204030204" pitchFamily="34" charset="0"/>
+              </a:rPr>
+              <a:t>“ aktueller Spielstatus</a:t>
+            </a:r>
+          </a:p>
+          <a:p>
+            <a:pPr marL="0" indent="0">
+              <a:lnSpc>
+                <a:spcPct val="107000"/>
+              </a:lnSpc>
+              <a:spcAft>
+                <a:spcPts val="800"/>
+              </a:spcAft>
+              <a:buNone/>
+            </a:pPr>
+            <a:endParaRPr lang="de-DE" dirty="0">
               <a:latin typeface="Calibri" panose="020F0502020204030204" pitchFamily="34" charset="0"/>
               <a:ea typeface="Calibri" panose="020F0502020204030204" pitchFamily="34" charset="0"/>
             </a:endParaRPr>
@@ -10580,426 +10833,6 @@
 </p:sld>
 </file>
 
-<file path=ppt/slides/slide6.xml><?xml version="1.0" encoding="utf-8"?>
-<p:sld xmlns:a="http://schemas.openxmlformats.org/drawingml/2006/main" xmlns:r="http://schemas.openxmlformats.org/officeDocument/2006/relationships" xmlns:p="http://schemas.openxmlformats.org/presentationml/2006/main">
-  <p:cSld>
-    <p:spTree>
-      <p:nvGrpSpPr>
-        <p:cNvPr id="1" name=""/>
-        <p:cNvGrpSpPr/>
-        <p:nvPr/>
-      </p:nvGrpSpPr>
-      <p:grpSpPr>
-        <a:xfrm>
-          <a:off x="0" y="0"/>
-          <a:ext cx="0" cy="0"/>
-          <a:chOff x="0" y="0"/>
-          <a:chExt cx="0" cy="0"/>
-        </a:xfrm>
-      </p:grpSpPr>
-      <p:sp>
-        <p:nvSpPr>
-          <p:cNvPr id="2" name="Titel 1">
-            <a:extLst>
-              <a:ext uri="{FF2B5EF4-FFF2-40B4-BE49-F238E27FC236}">
-                <a16:creationId xmlns:a16="http://schemas.microsoft.com/office/drawing/2014/main" id="{27F4C7B4-7678-4C85-8CBD-5AE147B21F84}"/>
-              </a:ext>
-            </a:extLst>
-          </p:cNvPr>
-          <p:cNvSpPr>
-            <a:spLocks noGrp="1"/>
-          </p:cNvSpPr>
-          <p:nvPr>
-            <p:ph type="title"/>
-          </p:nvPr>
-        </p:nvSpPr>
-        <p:spPr/>
-        <p:txBody>
-          <a:bodyPr/>
-          <a:lstStyle/>
-          <a:p>
-            <a:r>
-              <a:rPr lang="de-DE" dirty="0"/>
-              <a:t>Benötigte Funktionen</a:t>
-            </a:r>
-          </a:p>
-        </p:txBody>
-      </p:sp>
-      <p:sp>
-        <p:nvSpPr>
-          <p:cNvPr id="3" name="Foliennummernplatzhalter 2">
-            <a:extLst>
-              <a:ext uri="{FF2B5EF4-FFF2-40B4-BE49-F238E27FC236}">
-                <a16:creationId xmlns:a16="http://schemas.microsoft.com/office/drawing/2014/main" id="{C73B1146-D82F-42C9-A9B7-9567CC6A6A1D}"/>
-              </a:ext>
-            </a:extLst>
-          </p:cNvPr>
-          <p:cNvSpPr>
-            <a:spLocks noGrp="1"/>
-          </p:cNvSpPr>
-          <p:nvPr>
-            <p:ph type="sldNum" sz="quarter" idx="33"/>
-          </p:nvPr>
-        </p:nvSpPr>
-        <p:spPr/>
-        <p:txBody>
-          <a:bodyPr/>
-          <a:lstStyle/>
-          <a:p>
-            <a:pPr rtl="0"/>
-            <a:fld id="{19B51A1E-902D-48AF-9020-955120F399B6}" type="slidenum">
-              <a:rPr lang="de-DE" noProof="0" smtClean="0"/>
-              <a:pPr rtl="0"/>
-              <a:t>6</a:t>
-            </a:fld>
-            <a:endParaRPr lang="de-DE" noProof="0"/>
-          </a:p>
-        </p:txBody>
-      </p:sp>
-      <p:sp>
-        <p:nvSpPr>
-          <p:cNvPr id="4" name="Inhaltsplatzhalter 3">
-            <a:extLst>
-              <a:ext uri="{FF2B5EF4-FFF2-40B4-BE49-F238E27FC236}">
-                <a16:creationId xmlns:a16="http://schemas.microsoft.com/office/drawing/2014/main" id="{1C7DA80F-C068-4541-88E7-B863D573A0E2}"/>
-              </a:ext>
-            </a:extLst>
-          </p:cNvPr>
-          <p:cNvSpPr>
-            <a:spLocks noGrp="1"/>
-          </p:cNvSpPr>
-          <p:nvPr>
-            <p:ph idx="1"/>
-          </p:nvPr>
-        </p:nvSpPr>
-        <p:spPr/>
-        <p:txBody>
-          <a:bodyPr/>
-          <a:lstStyle/>
-          <a:p>
-            <a:pPr marL="0" indent="0">
-              <a:lnSpc>
-                <a:spcPct val="107000"/>
-              </a:lnSpc>
-              <a:spcAft>
-                <a:spcPts val="800"/>
-              </a:spcAft>
-              <a:buNone/>
-            </a:pPr>
-            <a:r>
-              <a:rPr lang="de-DE" sz="1800" b="1" dirty="0">
-                <a:effectLst/>
-                <a:latin typeface="Calibri" panose="020F0502020204030204" pitchFamily="34" charset="0"/>
-                <a:ea typeface="Calibri" panose="020F0502020204030204" pitchFamily="34" charset="0"/>
-              </a:rPr>
-              <a:t>Variablen:</a:t>
-            </a:r>
-          </a:p>
-          <a:p>
-            <a:pPr>
-              <a:lnSpc>
-                <a:spcPct val="107000"/>
-              </a:lnSpc>
-              <a:spcAft>
-                <a:spcPts val="800"/>
-              </a:spcAft>
-            </a:pPr>
-            <a:r>
-              <a:rPr lang="de-DE" sz="1800" i="1" dirty="0" err="1">
-                <a:solidFill>
-                  <a:srgbClr val="000000"/>
-                </a:solidFill>
-                <a:effectLst/>
-                <a:latin typeface="Calibri" panose="020F0502020204030204" pitchFamily="34" charset="0"/>
-                <a:ea typeface="Calibri" panose="020F0502020204030204" pitchFamily="34" charset="0"/>
-              </a:rPr>
-              <a:t>anzahlFalscheBuchstaben</a:t>
-            </a:r>
-            <a:r>
-              <a:rPr lang="de-DE" sz="1800" i="1" dirty="0">
-                <a:solidFill>
-                  <a:srgbClr val="000000"/>
-                </a:solidFill>
-                <a:effectLst/>
-                <a:latin typeface="Calibri" panose="020F0502020204030204" pitchFamily="34" charset="0"/>
-                <a:ea typeface="Calibri" panose="020F0502020204030204" pitchFamily="34" charset="0"/>
-              </a:rPr>
-              <a:t> (</a:t>
-            </a:r>
-            <a:r>
-              <a:rPr lang="de-DE" sz="1800" i="1" u="sng" dirty="0" err="1">
-                <a:solidFill>
-                  <a:srgbClr val="000000"/>
-                </a:solidFill>
-                <a:effectLst/>
-                <a:latin typeface="Calibri" panose="020F0502020204030204" pitchFamily="34" charset="0"/>
-                <a:ea typeface="Calibri" panose="020F0502020204030204" pitchFamily="34" charset="0"/>
-              </a:rPr>
-              <a:t>int</a:t>
-            </a:r>
-            <a:r>
-              <a:rPr lang="de-DE" sz="1800" i="1" dirty="0">
-                <a:solidFill>
-                  <a:srgbClr val="000000"/>
-                </a:solidFill>
-                <a:effectLst/>
-                <a:latin typeface="Calibri" panose="020F0502020204030204" pitchFamily="34" charset="0"/>
-                <a:ea typeface="Calibri" panose="020F0502020204030204" pitchFamily="34" charset="0"/>
-              </a:rPr>
-              <a:t>)</a:t>
-            </a:r>
-            <a:endParaRPr lang="de-DE" i="1" dirty="0">
-              <a:solidFill>
-                <a:srgbClr val="000000"/>
-              </a:solidFill>
-              <a:latin typeface="Calibri" panose="020F0502020204030204" pitchFamily="34" charset="0"/>
-              <a:ea typeface="Calibri" panose="020F0502020204030204" pitchFamily="34" charset="0"/>
-            </a:endParaRPr>
-          </a:p>
-          <a:p>
-            <a:pPr>
-              <a:lnSpc>
-                <a:spcPct val="107000"/>
-              </a:lnSpc>
-              <a:spcAft>
-                <a:spcPts val="800"/>
-              </a:spcAft>
-            </a:pPr>
-            <a:r>
-              <a:rPr lang="de-DE" sz="1800" i="1" dirty="0">
-                <a:solidFill>
-                  <a:srgbClr val="000000"/>
-                </a:solidFill>
-                <a:effectLst/>
-                <a:latin typeface="Calibri" panose="020F0502020204030204" pitchFamily="34" charset="0"/>
-                <a:ea typeface="Calibri" panose="020F0502020204030204" pitchFamily="34" charset="0"/>
-              </a:rPr>
-              <a:t> </a:t>
-            </a:r>
-            <a:r>
-              <a:rPr lang="de-DE" sz="1800" i="1" dirty="0" err="1">
-                <a:solidFill>
-                  <a:srgbClr val="000000"/>
-                </a:solidFill>
-                <a:effectLst/>
-                <a:latin typeface="Calibri" panose="020F0502020204030204" pitchFamily="34" charset="0"/>
-                <a:ea typeface="Calibri" panose="020F0502020204030204" pitchFamily="34" charset="0"/>
-              </a:rPr>
-              <a:t>spielVerloren</a:t>
-            </a:r>
-            <a:r>
-              <a:rPr lang="de-DE" sz="1800" i="1" dirty="0">
-                <a:solidFill>
-                  <a:srgbClr val="000000"/>
-                </a:solidFill>
-                <a:effectLst/>
-                <a:latin typeface="Calibri" panose="020F0502020204030204" pitchFamily="34" charset="0"/>
-                <a:ea typeface="Calibri" panose="020F0502020204030204" pitchFamily="34" charset="0"/>
-              </a:rPr>
-              <a:t> (</a:t>
-            </a:r>
-            <a:r>
-              <a:rPr lang="de-DE" sz="1800" i="1" dirty="0" err="1">
-                <a:solidFill>
-                  <a:srgbClr val="000000"/>
-                </a:solidFill>
-                <a:effectLst/>
-                <a:latin typeface="Calibri" panose="020F0502020204030204" pitchFamily="34" charset="0"/>
-                <a:ea typeface="Calibri" panose="020F0502020204030204" pitchFamily="34" charset="0"/>
-              </a:rPr>
-              <a:t>boolean</a:t>
-            </a:r>
-            <a:r>
-              <a:rPr lang="de-DE" sz="1800" i="1" dirty="0">
-                <a:solidFill>
-                  <a:srgbClr val="000000"/>
-                </a:solidFill>
-                <a:effectLst/>
-                <a:latin typeface="Calibri" panose="020F0502020204030204" pitchFamily="34" charset="0"/>
-                <a:ea typeface="Calibri" panose="020F0502020204030204" pitchFamily="34" charset="0"/>
-              </a:rPr>
-              <a:t>)</a:t>
-            </a:r>
-            <a:endParaRPr lang="de-DE" i="1" dirty="0">
-              <a:solidFill>
-                <a:srgbClr val="000000"/>
-              </a:solidFill>
-              <a:latin typeface="Calibri" panose="020F0502020204030204" pitchFamily="34" charset="0"/>
-              <a:ea typeface="Calibri" panose="020F0502020204030204" pitchFamily="34" charset="0"/>
-            </a:endParaRPr>
-          </a:p>
-          <a:p>
-            <a:pPr>
-              <a:lnSpc>
-                <a:spcPct val="107000"/>
-              </a:lnSpc>
-              <a:spcAft>
-                <a:spcPts val="800"/>
-              </a:spcAft>
-            </a:pPr>
-            <a:r>
-              <a:rPr lang="de-DE" sz="1800" i="1" dirty="0" err="1">
-                <a:solidFill>
-                  <a:srgbClr val="000000"/>
-                </a:solidFill>
-                <a:effectLst/>
-                <a:latin typeface="Calibri" panose="020F0502020204030204" pitchFamily="34" charset="0"/>
-                <a:ea typeface="Calibri" panose="020F0502020204030204" pitchFamily="34" charset="0"/>
-              </a:rPr>
-              <a:t>spielGewonnen</a:t>
-            </a:r>
-            <a:r>
-              <a:rPr lang="de-DE" sz="1800" i="1" dirty="0">
-                <a:solidFill>
-                  <a:srgbClr val="000000"/>
-                </a:solidFill>
-                <a:effectLst/>
-                <a:latin typeface="Calibri" panose="020F0502020204030204" pitchFamily="34" charset="0"/>
-                <a:ea typeface="Calibri" panose="020F0502020204030204" pitchFamily="34" charset="0"/>
-              </a:rPr>
-              <a:t> (</a:t>
-            </a:r>
-            <a:r>
-              <a:rPr lang="de-DE" sz="1800" i="1" dirty="0" err="1">
-                <a:solidFill>
-                  <a:srgbClr val="000000"/>
-                </a:solidFill>
-                <a:effectLst/>
-                <a:latin typeface="Calibri" panose="020F0502020204030204" pitchFamily="34" charset="0"/>
-                <a:ea typeface="Calibri" panose="020F0502020204030204" pitchFamily="34" charset="0"/>
-              </a:rPr>
-              <a:t>boolean</a:t>
-            </a:r>
-            <a:r>
-              <a:rPr lang="de-DE" sz="1800" i="1" dirty="0">
-                <a:solidFill>
-                  <a:srgbClr val="000000"/>
-                </a:solidFill>
-                <a:effectLst/>
-                <a:latin typeface="Calibri" panose="020F0502020204030204" pitchFamily="34" charset="0"/>
-                <a:ea typeface="Calibri" panose="020F0502020204030204" pitchFamily="34" charset="0"/>
-              </a:rPr>
-              <a:t>)</a:t>
-            </a:r>
-            <a:endParaRPr lang="de-DE" i="1" dirty="0">
-              <a:solidFill>
-                <a:srgbClr val="000000"/>
-              </a:solidFill>
-              <a:latin typeface="Calibri" panose="020F0502020204030204" pitchFamily="34" charset="0"/>
-              <a:ea typeface="Calibri" panose="020F0502020204030204" pitchFamily="34" charset="0"/>
-            </a:endParaRPr>
-          </a:p>
-          <a:p>
-            <a:pPr>
-              <a:lnSpc>
-                <a:spcPct val="107000"/>
-              </a:lnSpc>
-              <a:spcAft>
-                <a:spcPts val="800"/>
-              </a:spcAft>
-            </a:pPr>
-            <a:r>
-              <a:rPr lang="de-DE" sz="1800" i="1" dirty="0" err="1">
-                <a:solidFill>
-                  <a:srgbClr val="000000"/>
-                </a:solidFill>
-                <a:effectLst/>
-                <a:latin typeface="Calibri" panose="020F0502020204030204" pitchFamily="34" charset="0"/>
-                <a:ea typeface="Calibri" panose="020F0502020204030204" pitchFamily="34" charset="0"/>
-              </a:rPr>
-              <a:t>arrFalscheBuchstaben</a:t>
-            </a:r>
-            <a:endParaRPr lang="de-DE" i="1" dirty="0">
-              <a:solidFill>
-                <a:srgbClr val="000000"/>
-              </a:solidFill>
-              <a:latin typeface="Calibri" panose="020F0502020204030204" pitchFamily="34" charset="0"/>
-              <a:ea typeface="Calibri" panose="020F0502020204030204" pitchFamily="34" charset="0"/>
-            </a:endParaRPr>
-          </a:p>
-          <a:p>
-            <a:pPr>
-              <a:lnSpc>
-                <a:spcPct val="107000"/>
-              </a:lnSpc>
-              <a:spcAft>
-                <a:spcPts val="800"/>
-              </a:spcAft>
-            </a:pPr>
-            <a:r>
-              <a:rPr lang="de-DE" sz="1800" i="1" dirty="0" err="1">
-                <a:solidFill>
-                  <a:srgbClr val="000000"/>
-                </a:solidFill>
-                <a:effectLst/>
-                <a:latin typeface="Calibri" panose="020F0502020204030204" pitchFamily="34" charset="0"/>
-                <a:ea typeface="Calibri" panose="020F0502020204030204" pitchFamily="34" charset="0"/>
-              </a:rPr>
-              <a:t>arrGegebeneWörter</a:t>
-            </a:r>
-            <a:endParaRPr lang="de-DE" sz="1800" i="1" dirty="0">
-              <a:solidFill>
-                <a:srgbClr val="000000"/>
-              </a:solidFill>
-              <a:effectLst/>
-              <a:latin typeface="Calibri" panose="020F0502020204030204" pitchFamily="34" charset="0"/>
-              <a:ea typeface="Calibri" panose="020F0502020204030204" pitchFamily="34" charset="0"/>
-            </a:endParaRPr>
-          </a:p>
-          <a:p>
-            <a:pPr>
-              <a:lnSpc>
-                <a:spcPct val="107000"/>
-              </a:lnSpc>
-              <a:spcAft>
-                <a:spcPts val="800"/>
-              </a:spcAft>
-            </a:pPr>
-            <a:r>
-              <a:rPr lang="de-DE" sz="1800" i="1" dirty="0">
-                <a:solidFill>
-                  <a:srgbClr val="000000"/>
-                </a:solidFill>
-                <a:effectLst/>
-                <a:latin typeface="Calibri" panose="020F0502020204030204" pitchFamily="34" charset="0"/>
-                <a:ea typeface="Calibri" panose="020F0502020204030204" pitchFamily="34" charset="0"/>
-              </a:rPr>
-              <a:t>fina</a:t>
-            </a:r>
-            <a:r>
-              <a:rPr lang="de-DE" i="1" dirty="0">
-                <a:solidFill>
-                  <a:srgbClr val="000000"/>
-                </a:solidFill>
-                <a:latin typeface="Calibri" panose="020F0502020204030204" pitchFamily="34" charset="0"/>
-                <a:ea typeface="Calibri" panose="020F0502020204030204" pitchFamily="34" charset="0"/>
-              </a:rPr>
-              <a:t>l </a:t>
-            </a:r>
-            <a:endParaRPr lang="de-DE" sz="1800" dirty="0">
-              <a:effectLst/>
-              <a:latin typeface="Calibri" panose="020F0502020204030204" pitchFamily="34" charset="0"/>
-              <a:ea typeface="Calibri" panose="020F0502020204030204" pitchFamily="34" charset="0"/>
-            </a:endParaRPr>
-          </a:p>
-          <a:p>
-            <a:endParaRPr lang="de-DE" dirty="0"/>
-          </a:p>
-        </p:txBody>
-      </p:sp>
-    </p:spTree>
-    <p:extLst>
-      <p:ext uri="{BB962C8B-B14F-4D97-AF65-F5344CB8AC3E}">
-        <p14:creationId xmlns:p14="http://schemas.microsoft.com/office/powerpoint/2010/main" val="1063012907"/>
-      </p:ext>
-    </p:extLst>
-  </p:cSld>
-  <p:clrMapOvr>
-    <a:masterClrMapping/>
-  </p:clrMapOvr>
-</p:sld>
-</file>
-
 <file path=ppt/slides/slide7.xml><?xml version="1.0" encoding="utf-8"?>
 <p:sld xmlns:a="http://schemas.openxmlformats.org/drawingml/2006/main" xmlns:r="http://schemas.openxmlformats.org/officeDocument/2006/relationships" xmlns:p="http://schemas.openxmlformats.org/presentationml/2006/main">
   <p:cSld>
@@ -11019,77 +10852,398 @@
       </p:grpSpPr>
       <p:sp>
         <p:nvSpPr>
-          <p:cNvPr id="22" name="Textfeld 21">
-            <a:extLst>
-              <a:ext uri="{FF2B5EF4-FFF2-40B4-BE49-F238E27FC236}">
-                <a16:creationId xmlns:a16="http://schemas.microsoft.com/office/drawing/2014/main" id="{19352CF6-0F22-45A8-B28B-37FAFCE5C5D6}"/>
-              </a:ext>
-            </a:extLst>
-          </p:cNvPr>
-          <p:cNvSpPr txBox="1"/>
-          <p:nvPr/>
-        </p:nvSpPr>
-        <p:spPr>
-          <a:xfrm>
-            <a:off x="10251642" y="182562"/>
-            <a:ext cx="1662546" cy="404658"/>
-          </a:xfrm>
-          <a:prstGeom prst="rect">
-            <a:avLst/>
-          </a:prstGeom>
-          <a:noFill/>
-        </p:spPr>
-        <p:txBody>
-          <a:bodyPr wrap="square" lIns="0" tIns="36000" rIns="0" bIns="0" rtlCol="0">
-            <a:spAutoFit/>
-          </a:bodyPr>
+          <p:cNvPr id="2" name="Titel 1">
+            <a:extLst>
+              <a:ext uri="{FF2B5EF4-FFF2-40B4-BE49-F238E27FC236}">
+                <a16:creationId xmlns:a16="http://schemas.microsoft.com/office/drawing/2014/main" id="{27F4C7B4-7678-4C85-8CBD-5AE147B21F84}"/>
+              </a:ext>
+            </a:extLst>
+          </p:cNvPr>
+          <p:cNvSpPr>
+            <a:spLocks noGrp="1"/>
+          </p:cNvSpPr>
+          <p:nvPr>
+            <p:ph type="title"/>
+          </p:nvPr>
+        </p:nvSpPr>
+        <p:spPr/>
+        <p:txBody>
+          <a:bodyPr/>
           <a:lstStyle/>
           <a:p>
-            <a:pPr algn="r" rtl="0">
+            <a:r>
+              <a:rPr lang="de-DE" dirty="0"/>
+              <a:t>Benötigte Funktionen</a:t>
+            </a:r>
+          </a:p>
+        </p:txBody>
+      </p:sp>
+      <p:sp>
+        <p:nvSpPr>
+          <p:cNvPr id="3" name="Foliennummernplatzhalter 2">
+            <a:extLst>
+              <a:ext uri="{FF2B5EF4-FFF2-40B4-BE49-F238E27FC236}">
+                <a16:creationId xmlns:a16="http://schemas.microsoft.com/office/drawing/2014/main" id="{C73B1146-D82F-42C9-A9B7-9567CC6A6A1D}"/>
+              </a:ext>
+            </a:extLst>
+          </p:cNvPr>
+          <p:cNvSpPr>
+            <a:spLocks noGrp="1"/>
+          </p:cNvSpPr>
+          <p:nvPr>
+            <p:ph type="sldNum" sz="quarter" idx="33"/>
+          </p:nvPr>
+        </p:nvSpPr>
+        <p:spPr/>
+        <p:txBody>
+          <a:bodyPr/>
+          <a:lstStyle/>
+          <a:p>
+            <a:pPr rtl="0"/>
+            <a:fld id="{19B51A1E-902D-48AF-9020-955120F399B6}" type="slidenum">
+              <a:rPr lang="de-DE" noProof="0" smtClean="0"/>
+              <a:pPr rtl="0"/>
+              <a:t>7</a:t>
+            </a:fld>
+            <a:endParaRPr lang="de-DE" noProof="0"/>
+          </a:p>
+        </p:txBody>
+      </p:sp>
+      <p:sp>
+        <p:nvSpPr>
+          <p:cNvPr id="4" name="Inhaltsplatzhalter 3">
+            <a:extLst>
+              <a:ext uri="{FF2B5EF4-FFF2-40B4-BE49-F238E27FC236}">
+                <a16:creationId xmlns:a16="http://schemas.microsoft.com/office/drawing/2014/main" id="{1C7DA80F-C068-4541-88E7-B863D573A0E2}"/>
+              </a:ext>
+            </a:extLst>
+          </p:cNvPr>
+          <p:cNvSpPr>
+            <a:spLocks noGrp="1"/>
+          </p:cNvSpPr>
+          <p:nvPr>
+            <p:ph idx="1"/>
+          </p:nvPr>
+        </p:nvSpPr>
+        <p:spPr/>
+        <p:txBody>
+          <a:bodyPr/>
+          <a:lstStyle/>
+          <a:p>
+            <a:pPr marL="0" indent="0">
               <a:lnSpc>
-                <a:spcPts val="1400"/>
+                <a:spcPct val="107000"/>
               </a:lnSpc>
+              <a:spcAft>
+                <a:spcPts val="800"/>
+              </a:spcAft>
+              <a:buNone/>
             </a:pPr>
             <a:r>
-              <a:rPr lang="de-DE" sz="1600" b="1" spc="-100" dirty="0">
+              <a:rPr lang="de-DE" sz="1800" b="1" dirty="0">
+                <a:effectLst/>
+                <a:latin typeface="Calibri" panose="020F0502020204030204" pitchFamily="34" charset="0"/>
+                <a:ea typeface="Calibri" panose="020F0502020204030204" pitchFamily="34" charset="0"/>
+              </a:rPr>
+              <a:t>Variablen:</a:t>
+            </a:r>
+          </a:p>
+          <a:p>
+            <a:pPr>
+              <a:lnSpc>
+                <a:spcPct val="107000"/>
+              </a:lnSpc>
+              <a:spcAft>
+                <a:spcPts val="800"/>
+              </a:spcAft>
+            </a:pPr>
+            <a:r>
+              <a:rPr lang="de-DE" sz="1800" i="1" dirty="0" err="1">
                 <a:solidFill>
-                  <a:schemeClr val="tx1">
-                    <a:lumMod val="50000"/>
-                    <a:lumOff val="50000"/>
-                  </a:schemeClr>
+                  <a:srgbClr val="000000"/>
                 </a:solidFill>
-                <a:latin typeface="Corbel" panose="020B0503020204020204" pitchFamily="34" charset="0"/>
+                <a:effectLst/>
+                <a:latin typeface="Calibri" panose="020F0502020204030204" pitchFamily="34" charset="0"/>
+                <a:ea typeface="Calibri" panose="020F0502020204030204" pitchFamily="34" charset="0"/>
               </a:rPr>
-              <a:t>Programmieren</a:t>
-            </a:r>
-            <a:r>
-              <a:rPr lang="de-DE" sz="1600" b="1" spc="-100" dirty="0">
+              <a:t>anzahlFalscheBuchstaben</a:t>
+            </a:r>
+            <a:r>
+              <a:rPr lang="de-DE" sz="1800" i="1" dirty="0">
                 <a:solidFill>
-                  <a:schemeClr val="accent1"/>
+                  <a:srgbClr val="000000"/>
                 </a:solidFill>
-                <a:latin typeface="Corbel" panose="020B0503020204020204" pitchFamily="34" charset="0"/>
+                <a:effectLst/>
+                <a:latin typeface="Calibri" panose="020F0502020204030204" pitchFamily="34" charset="0"/>
+                <a:ea typeface="Calibri" panose="020F0502020204030204" pitchFamily="34" charset="0"/>
+              </a:rPr>
+              <a:t> (</a:t>
+            </a:r>
+            <a:r>
+              <a:rPr lang="de-DE" sz="1800" i="1" u="sng" dirty="0" err="1">
+                <a:solidFill>
+                  <a:srgbClr val="000000"/>
+                </a:solidFill>
+                <a:effectLst/>
+                <a:latin typeface="Calibri" panose="020F0502020204030204" pitchFamily="34" charset="0"/>
+                <a:ea typeface="Calibri" panose="020F0502020204030204" pitchFamily="34" charset="0"/>
+              </a:rPr>
+              <a:t>int</a:t>
+            </a:r>
+            <a:r>
+              <a:rPr lang="de-DE" sz="1800" i="1" dirty="0">
+                <a:solidFill>
+                  <a:srgbClr val="000000"/>
+                </a:solidFill>
+                <a:effectLst/>
+                <a:latin typeface="Calibri" panose="020F0502020204030204" pitchFamily="34" charset="0"/>
+                <a:ea typeface="Calibri" panose="020F0502020204030204" pitchFamily="34" charset="0"/>
+              </a:rPr>
+              <a:t>)</a:t>
+            </a:r>
+            <a:endParaRPr lang="de-DE" i="1" dirty="0">
+              <a:solidFill>
+                <a:srgbClr val="000000"/>
+              </a:solidFill>
+              <a:latin typeface="Calibri" panose="020F0502020204030204" pitchFamily="34" charset="0"/>
+              <a:ea typeface="Calibri" panose="020F0502020204030204" pitchFamily="34" charset="0"/>
+            </a:endParaRPr>
+          </a:p>
+          <a:p>
+            <a:pPr>
+              <a:lnSpc>
+                <a:spcPct val="107000"/>
+              </a:lnSpc>
+              <a:spcAft>
+                <a:spcPts val="800"/>
+              </a:spcAft>
+            </a:pPr>
+            <a:r>
+              <a:rPr lang="de-DE" sz="1800" i="1" dirty="0">
+                <a:solidFill>
+                  <a:srgbClr val="000000"/>
+                </a:solidFill>
+                <a:effectLst/>
+                <a:latin typeface="Calibri" panose="020F0502020204030204" pitchFamily="34" charset="0"/>
+                <a:ea typeface="Calibri" panose="020F0502020204030204" pitchFamily="34" charset="0"/>
               </a:rPr>
               <a:t> </a:t>
             </a:r>
             <a:r>
-              <a:rPr lang="de-DE" sz="1600" b="1" spc="-100" dirty="0">
-                <a:latin typeface="Corbel" panose="020B0503020204020204" pitchFamily="34" charset="0"/>
+              <a:rPr lang="de-DE" sz="1800" i="1" dirty="0" err="1">
+                <a:solidFill>
+                  <a:srgbClr val="000000"/>
+                </a:solidFill>
+                <a:effectLst/>
+                <a:latin typeface="Calibri" panose="020F0502020204030204" pitchFamily="34" charset="0"/>
+                <a:ea typeface="Calibri" panose="020F0502020204030204" pitchFamily="34" charset="0"/>
               </a:rPr>
-              <a:t>ON22</a:t>
-            </a:r>
-            <a:endParaRPr lang="de-DE" sz="1600" b="1" spc="-100" dirty="0">
+              <a:t>spielVerloren</a:t>
+            </a:r>
+            <a:r>
+              <a:rPr lang="de-DE" sz="1800" i="1" dirty="0">
+                <a:solidFill>
+                  <a:srgbClr val="000000"/>
+                </a:solidFill>
+                <a:effectLst/>
+                <a:latin typeface="Calibri" panose="020F0502020204030204" pitchFamily="34" charset="0"/>
+                <a:ea typeface="Calibri" panose="020F0502020204030204" pitchFamily="34" charset="0"/>
+              </a:rPr>
+              <a:t> (</a:t>
+            </a:r>
+            <a:r>
+              <a:rPr lang="de-DE" sz="1800" i="1" dirty="0" err="1">
+                <a:solidFill>
+                  <a:srgbClr val="000000"/>
+                </a:solidFill>
+                <a:effectLst/>
+                <a:latin typeface="Calibri" panose="020F0502020204030204" pitchFamily="34" charset="0"/>
+                <a:ea typeface="Calibri" panose="020F0502020204030204" pitchFamily="34" charset="0"/>
+              </a:rPr>
+              <a:t>boolean</a:t>
+            </a:r>
+            <a:r>
+              <a:rPr lang="de-DE" sz="1800" i="1" dirty="0">
+                <a:solidFill>
+                  <a:srgbClr val="000000"/>
+                </a:solidFill>
+                <a:effectLst/>
+                <a:latin typeface="Calibri" panose="020F0502020204030204" pitchFamily="34" charset="0"/>
+                <a:ea typeface="Calibri" panose="020F0502020204030204" pitchFamily="34" charset="0"/>
+              </a:rPr>
+              <a:t>)</a:t>
+            </a:r>
+            <a:endParaRPr lang="de-DE" i="1" dirty="0">
               <a:solidFill>
-                <a:schemeClr val="tx1"/>
+                <a:srgbClr val="000000"/>
               </a:solidFill>
-              <a:latin typeface="Corbel" panose="020B0503020204020204" pitchFamily="34" charset="0"/>
+              <a:latin typeface="Calibri" panose="020F0502020204030204" pitchFamily="34" charset="0"/>
+              <a:ea typeface="Calibri" panose="020F0502020204030204" pitchFamily="34" charset="0"/>
             </a:endParaRPr>
+          </a:p>
+          <a:p>
+            <a:pPr>
+              <a:lnSpc>
+                <a:spcPct val="107000"/>
+              </a:lnSpc>
+              <a:spcAft>
+                <a:spcPts val="800"/>
+              </a:spcAft>
+            </a:pPr>
+            <a:r>
+              <a:rPr lang="de-DE" sz="1800" i="1" dirty="0" err="1">
+                <a:solidFill>
+                  <a:srgbClr val="000000"/>
+                </a:solidFill>
+                <a:effectLst/>
+                <a:latin typeface="Calibri" panose="020F0502020204030204" pitchFamily="34" charset="0"/>
+                <a:ea typeface="Calibri" panose="020F0502020204030204" pitchFamily="34" charset="0"/>
+              </a:rPr>
+              <a:t>spielGewonnen</a:t>
+            </a:r>
+            <a:r>
+              <a:rPr lang="de-DE" sz="1800" i="1" dirty="0">
+                <a:solidFill>
+                  <a:srgbClr val="000000"/>
+                </a:solidFill>
+                <a:effectLst/>
+                <a:latin typeface="Calibri" panose="020F0502020204030204" pitchFamily="34" charset="0"/>
+                <a:ea typeface="Calibri" panose="020F0502020204030204" pitchFamily="34" charset="0"/>
+              </a:rPr>
+              <a:t> (</a:t>
+            </a:r>
+            <a:r>
+              <a:rPr lang="de-DE" sz="1800" i="1" dirty="0" err="1">
+                <a:solidFill>
+                  <a:srgbClr val="000000"/>
+                </a:solidFill>
+                <a:effectLst/>
+                <a:latin typeface="Calibri" panose="020F0502020204030204" pitchFamily="34" charset="0"/>
+                <a:ea typeface="Calibri" panose="020F0502020204030204" pitchFamily="34" charset="0"/>
+              </a:rPr>
+              <a:t>boolean</a:t>
+            </a:r>
+            <a:r>
+              <a:rPr lang="de-DE" sz="1800" i="1" dirty="0">
+                <a:solidFill>
+                  <a:srgbClr val="000000"/>
+                </a:solidFill>
+                <a:effectLst/>
+                <a:latin typeface="Calibri" panose="020F0502020204030204" pitchFamily="34" charset="0"/>
+                <a:ea typeface="Calibri" panose="020F0502020204030204" pitchFamily="34" charset="0"/>
+              </a:rPr>
+              <a:t>)</a:t>
+            </a:r>
+            <a:endParaRPr lang="de-DE" i="1" dirty="0">
+              <a:solidFill>
+                <a:srgbClr val="000000"/>
+              </a:solidFill>
+              <a:latin typeface="Calibri" panose="020F0502020204030204" pitchFamily="34" charset="0"/>
+              <a:ea typeface="Calibri" panose="020F0502020204030204" pitchFamily="34" charset="0"/>
+            </a:endParaRPr>
+          </a:p>
+          <a:p>
+            <a:pPr>
+              <a:lnSpc>
+                <a:spcPct val="107000"/>
+              </a:lnSpc>
+              <a:spcAft>
+                <a:spcPts val="800"/>
+              </a:spcAft>
+            </a:pPr>
+            <a:r>
+              <a:rPr lang="de-DE" sz="1800" i="1" dirty="0" err="1">
+                <a:solidFill>
+                  <a:srgbClr val="000000"/>
+                </a:solidFill>
+                <a:effectLst/>
+                <a:latin typeface="Calibri" panose="020F0502020204030204" pitchFamily="34" charset="0"/>
+                <a:ea typeface="Calibri" panose="020F0502020204030204" pitchFamily="34" charset="0"/>
+              </a:rPr>
+              <a:t>arrFalscheBuchstaben</a:t>
+            </a:r>
+            <a:endParaRPr lang="de-DE" i="1" dirty="0">
+              <a:solidFill>
+                <a:srgbClr val="000000"/>
+              </a:solidFill>
+              <a:latin typeface="Calibri" panose="020F0502020204030204" pitchFamily="34" charset="0"/>
+              <a:ea typeface="Calibri" panose="020F0502020204030204" pitchFamily="34" charset="0"/>
+            </a:endParaRPr>
+          </a:p>
+          <a:p>
+            <a:pPr>
+              <a:lnSpc>
+                <a:spcPct val="107000"/>
+              </a:lnSpc>
+              <a:spcAft>
+                <a:spcPts val="800"/>
+              </a:spcAft>
+            </a:pPr>
+            <a:r>
+              <a:rPr lang="de-DE" sz="1800" i="1" dirty="0" err="1">
+                <a:solidFill>
+                  <a:srgbClr val="000000"/>
+                </a:solidFill>
+                <a:effectLst/>
+                <a:latin typeface="Calibri" panose="020F0502020204030204" pitchFamily="34" charset="0"/>
+                <a:ea typeface="Calibri" panose="020F0502020204030204" pitchFamily="34" charset="0"/>
+              </a:rPr>
+              <a:t>arrGegebeneWörter</a:t>
+            </a:r>
+            <a:endParaRPr lang="de-DE" sz="1800" i="1" dirty="0">
+              <a:solidFill>
+                <a:srgbClr val="000000"/>
+              </a:solidFill>
+              <a:effectLst/>
+              <a:latin typeface="Calibri" panose="020F0502020204030204" pitchFamily="34" charset="0"/>
+              <a:ea typeface="Calibri" panose="020F0502020204030204" pitchFamily="34" charset="0"/>
+            </a:endParaRPr>
+          </a:p>
+          <a:p>
+            <a:pPr>
+              <a:lnSpc>
+                <a:spcPct val="107000"/>
+              </a:lnSpc>
+              <a:spcAft>
+                <a:spcPts val="800"/>
+              </a:spcAft>
+            </a:pPr>
+            <a:r>
+              <a:rPr lang="de-DE" sz="1800" i="1" dirty="0">
+                <a:solidFill>
+                  <a:srgbClr val="000000"/>
+                </a:solidFill>
+                <a:effectLst/>
+                <a:latin typeface="Calibri" panose="020F0502020204030204" pitchFamily="34" charset="0"/>
+                <a:ea typeface="Calibri" panose="020F0502020204030204" pitchFamily="34" charset="0"/>
+              </a:rPr>
+              <a:t>fina</a:t>
+            </a:r>
+            <a:r>
+              <a:rPr lang="de-DE" i="1" dirty="0">
+                <a:solidFill>
+                  <a:srgbClr val="000000"/>
+                </a:solidFill>
+                <a:latin typeface="Calibri" panose="020F0502020204030204" pitchFamily="34" charset="0"/>
+                <a:ea typeface="Calibri" panose="020F0502020204030204" pitchFamily="34" charset="0"/>
+              </a:rPr>
+              <a:t>l </a:t>
+            </a:r>
+            <a:endParaRPr lang="de-DE" sz="1800" dirty="0">
+              <a:effectLst/>
+              <a:latin typeface="Calibri" panose="020F0502020204030204" pitchFamily="34" charset="0"/>
+              <a:ea typeface="Calibri" panose="020F0502020204030204" pitchFamily="34" charset="0"/>
+            </a:endParaRPr>
+          </a:p>
+          <a:p>
+            <a:endParaRPr lang="de-DE" dirty="0"/>
           </a:p>
         </p:txBody>
       </p:sp>
     </p:spTree>
     <p:extLst>
       <p:ext uri="{BB962C8B-B14F-4D97-AF65-F5344CB8AC3E}">
-        <p14:creationId xmlns:p14="http://schemas.microsoft.com/office/powerpoint/2010/main" val="2774107021"/>
+        <p14:creationId xmlns:p14="http://schemas.microsoft.com/office/powerpoint/2010/main" val="1063012907"/>
       </p:ext>
     </p:extLst>
   </p:cSld>
@@ -11188,7 +11342,7 @@
     </p:spTree>
     <p:extLst>
       <p:ext uri="{BB962C8B-B14F-4D97-AF65-F5344CB8AC3E}">
-        <p14:creationId xmlns:p14="http://schemas.microsoft.com/office/powerpoint/2010/main" val="497035229"/>
+        <p14:creationId xmlns:p14="http://schemas.microsoft.com/office/powerpoint/2010/main" val="2774107021"/>
       </p:ext>
     </p:extLst>
   </p:cSld>
@@ -11287,7 +11441,7 @@
     </p:spTree>
     <p:extLst>
       <p:ext uri="{BB962C8B-B14F-4D97-AF65-F5344CB8AC3E}">
-        <p14:creationId xmlns:p14="http://schemas.microsoft.com/office/powerpoint/2010/main" val="1228077506"/>
+        <p14:creationId xmlns:p14="http://schemas.microsoft.com/office/powerpoint/2010/main" val="497035229"/>
       </p:ext>
     </p:extLst>
   </p:cSld>
@@ -12122,12 +12276,12 @@
 </file>
 
 <file path=customXml/item1.xml><?xml version="1.0" encoding="utf-8"?>
-<p:properties xmlns:p="http://schemas.microsoft.com/office/2006/metadata/properties" xmlns:xsi="http://www.w3.org/2001/XMLSchema-instance" xmlns:pc="http://schemas.microsoft.com/office/infopath/2007/PartnerControls">
-  <documentManagement>
-    <_ip_UnifiedCompliancePolicyUIAction xmlns="http://schemas.microsoft.com/sharepoint/v3" xsi:nil="true"/>
-    <_ip_UnifiedCompliancePolicyProperties xmlns="http://schemas.microsoft.com/sharepoint/v3" xsi:nil="true"/>
-  </documentManagement>
-</p:properties>
+<?mso-contentType ?>
+<FormTemplates xmlns="http://schemas.microsoft.com/sharepoint/v3/contenttype/forms">
+  <Display>DocumentLibraryForm</Display>
+  <Edit>DocumentLibraryForm</Edit>
+  <New>DocumentLibraryForm</New>
+</FormTemplates>
 </file>
 
 <file path=customXml/item2.xml><?xml version="1.0" encoding="utf-8"?>
@@ -12339,20 +12493,18 @@
 </file>
 
 <file path=customXml/item3.xml><?xml version="1.0" encoding="utf-8"?>
-<?mso-contentType ?>
-<FormTemplates xmlns="http://schemas.microsoft.com/sharepoint/v3/contenttype/forms">
-  <Display>DocumentLibraryForm</Display>
-  <Edit>DocumentLibraryForm</Edit>
-  <New>DocumentLibraryForm</New>
-</FormTemplates>
+<p:properties xmlns:p="http://schemas.microsoft.com/office/2006/metadata/properties" xmlns:xsi="http://www.w3.org/2001/XMLSchema-instance" xmlns:pc="http://schemas.microsoft.com/office/infopath/2007/PartnerControls">
+  <documentManagement>
+    <_ip_UnifiedCompliancePolicyUIAction xmlns="http://schemas.microsoft.com/sharepoint/v3" xsi:nil="true"/>
+    <_ip_UnifiedCompliancePolicyProperties xmlns="http://schemas.microsoft.com/sharepoint/v3" xsi:nil="true"/>
+  </documentManagement>
+</p:properties>
 </file>
 
 <file path=customXml/itemProps1.xml><?xml version="1.0" encoding="utf-8"?>
-<ds:datastoreItem xmlns:ds="http://schemas.openxmlformats.org/officeDocument/2006/customXml" ds:itemID="{E4934E25-8442-49E9-ABDF-3146C4145F3B}">
+<ds:datastoreItem xmlns:ds="http://schemas.openxmlformats.org/officeDocument/2006/customXml" ds:itemID="{F6CB1848-D3E0-4F10-B640-720BE758B85B}">
   <ds:schemaRefs>
-    <ds:schemaRef ds:uri="http://schemas.microsoft.com/office/2006/metadata/properties"/>
-    <ds:schemaRef ds:uri="http://schemas.microsoft.com/office/infopath/2007/PartnerControls"/>
-    <ds:schemaRef ds:uri="http://schemas.microsoft.com/sharepoint/v3"/>
+    <ds:schemaRef ds:uri="http://schemas.microsoft.com/sharepoint/v3/contenttype/forms"/>
   </ds:schemaRefs>
 </ds:datastoreItem>
 </file>
@@ -12378,9 +12530,11 @@
 </file>
 
 <file path=customXml/itemProps3.xml><?xml version="1.0" encoding="utf-8"?>
-<ds:datastoreItem xmlns:ds="http://schemas.openxmlformats.org/officeDocument/2006/customXml" ds:itemID="{F6CB1848-D3E0-4F10-B640-720BE758B85B}">
+<ds:datastoreItem xmlns:ds="http://schemas.openxmlformats.org/officeDocument/2006/customXml" ds:itemID="{E4934E25-8442-49E9-ABDF-3146C4145F3B}">
   <ds:schemaRefs>
-    <ds:schemaRef ds:uri="http://schemas.microsoft.com/sharepoint/v3/contenttype/forms"/>
+    <ds:schemaRef ds:uri="http://schemas.microsoft.com/office/2006/metadata/properties"/>
+    <ds:schemaRef ds:uri="http://schemas.microsoft.com/office/infopath/2007/PartnerControls"/>
+    <ds:schemaRef ds:uri="http://schemas.microsoft.com/sharepoint/v3"/>
   </ds:schemaRefs>
 </ds:datastoreItem>
 </file>
</xml_diff>